<commit_message>
update the collision function
</commit_message>
<xml_diff>
--- a/A_PowerPoint/reference.pptx
+++ b/A_PowerPoint/reference.pptx
@@ -18,13 +18,14 @@
     <p:sldId id="265" r:id="rId11"/>
     <p:sldId id="264" r:id="rId12"/>
     <p:sldId id="269" r:id="rId13"/>
-    <p:sldId id="270" r:id="rId14"/>
-    <p:sldId id="257" r:id="rId15"/>
+    <p:sldId id="272" r:id="rId14"/>
+    <p:sldId id="270" r:id="rId15"/>
+    <p:sldId id="257" r:id="rId16"/>
   </p:sldIdLst>
   <p:sldSz cx="12192000" cy="6858000"/>
   <p:notesSz cx="6858000" cy="9144000"/>
   <p:custDataLst>
-    <p:tags r:id="rId19"/>
+    <p:tags r:id="rId20"/>
   </p:custDataLst>
   <p:defaultTextStyle>
     <a:defPPr>
@@ -603,6 +604,58 @@
 </file>
 
 <file path=ppt/notesSlides/notesSlide3.xml><?xml version="1.0" encoding="utf-8"?>
+<p:notes xmlns:a="http://schemas.openxmlformats.org/drawingml/2006/main" xmlns:r="http://schemas.openxmlformats.org/officeDocument/2006/relationships" xmlns:p="http://schemas.openxmlformats.org/presentationml/2006/main">
+  <p:cSld>
+    <p:spTree>
+      <p:nvGrpSpPr>
+        <p:cNvPr id="1" name=""/>
+        <p:cNvGrpSpPr/>
+        <p:nvPr/>
+      </p:nvGrpSpPr>
+      <p:grpSpPr/>
+      <p:sp>
+        <p:nvSpPr>
+          <p:cNvPr id="2" name="幻灯片图像占位符 1"/>
+          <p:cNvSpPr/>
+          <p:nvPr>
+            <p:ph type="sldImg" idx="2"/>
+          </p:nvPr>
+        </p:nvSpPr>
+        <p:spPr/>
+      </p:sp>
+      <p:sp>
+        <p:nvSpPr>
+          <p:cNvPr id="3" name="文本占位符 2"/>
+          <p:cNvSpPr/>
+          <p:nvPr>
+            <p:ph type="body" idx="3"/>
+          </p:nvPr>
+        </p:nvSpPr>
+        <p:spPr/>
+        <p:txBody>
+          <a:bodyPr/>
+          <a:p>
+            <a:r>
+              <a:rPr lang="zh-CN" altLang="en-US"/>
+              <a:t>一个可以</a:t>
+            </a:r>
+            <a:r>
+              <a:rPr lang="zh-CN" altLang="en-US"/>
+              <a:t>持续反馈vr动态物体运动状态的控制器</a:t>
+            </a:r>
+            <a:endParaRPr lang="zh-CN" altLang="en-US"/>
+          </a:p>
+        </p:txBody>
+      </p:sp>
+    </p:spTree>
+  </p:cSld>
+  <p:clrMapOvr>
+    <a:masterClrMapping/>
+  </p:clrMapOvr>
+</p:notes>
+</file>
+
+<file path=ppt/notesSlides/notesSlide4.xml><?xml version="1.0" encoding="utf-8"?>
 <p:notes xmlns:a="http://schemas.openxmlformats.org/drawingml/2006/main" xmlns:r="http://schemas.openxmlformats.org/officeDocument/2006/relationships" xmlns:p="http://schemas.openxmlformats.org/presentationml/2006/main">
   <p:cSld>
     <p:spTree>
@@ -3698,57 +3751,92 @@
             <a:spLocks noGrp="1"/>
           </p:cNvSpPr>
           <p:nvPr>
-            <p:ph type="title"/>
-          </p:nvPr>
-        </p:nvSpPr>
-        <p:spPr/>
-        <p:txBody>
-          <a:bodyPr/>
-          <a:p>
-            <a:endParaRPr lang="zh-CN" altLang="en-US"/>
-          </a:p>
-        </p:txBody>
-      </p:sp>
-      <p:sp>
-        <p:nvSpPr>
-          <p:cNvPr id="3" name="内容占位符 2"/>
-          <p:cNvSpPr>
-            <a:spLocks noGrp="1"/>
-          </p:cNvSpPr>
-          <p:nvPr>
-            <p:ph idx="1"/>
-          </p:nvPr>
-        </p:nvSpPr>
-        <p:spPr/>
-        <p:txBody>
-          <a:bodyPr/>
-          <a:p>
-            <a:pPr marL="0" indent="0">
-              <a:buNone/>
-            </a:pPr>
-            <a:r>
-              <a:rPr lang="en-US" altLang="en-US"/>
-              <a:t>&gt; </a:t>
-            </a:r>
+            <p:ph type="ctrTitle"/>
+          </p:nvPr>
+        </p:nvSpPr>
+        <p:spPr/>
+        <p:txBody>
+          <a:bodyPr>
+            <a:normAutofit/>
+          </a:bodyPr>
+          <a:p>
             <a:r>
               <a:rPr lang="zh-CN" altLang="en-US"/>
-              <a:t>A Survey on Simulation for Weight Perception in Virtual Reality</a:t>
-            </a:r>
-            <a:endParaRPr lang="zh-CN" altLang="en-US"/>
-          </a:p>
-          <a:p>
-            <a:endParaRPr lang="zh-CN" altLang="en-US"/>
-          </a:p>
-          <a:p>
+              <a:t>A</a:t>
+            </a:r>
             <a:r>
               <a:rPr lang="en-US" altLang="zh-CN"/>
-              <a:t>I</a:t>
+              <a:t> continuous</a:t>
             </a:r>
             <a:r>
               <a:rPr lang="zh-CN" altLang="en-US"/>
-              <a:t>nconsistency of vistual feedback and real hand motion</a:t>
-            </a:r>
-            <a:endParaRPr lang="zh-CN" altLang="en-US"/>
+              <a:t> </a:t>
+            </a:r>
+            <a:r>
+              <a:rPr lang="en-US" altLang="zh-CN"/>
+              <a:t>motion feedback </a:t>
+            </a:r>
+            <a:r>
+              <a:rPr lang="zh-CN" altLang="en-US"/>
+              <a:t>controller</a:t>
+            </a:r>
+            <a:endParaRPr lang="zh-CN" altLang="en-US"/>
+          </a:p>
+        </p:txBody>
+      </p:sp>
+      <p:sp>
+        <p:nvSpPr>
+          <p:cNvPr id="3" name="副标题 2"/>
+          <p:cNvSpPr>
+            <a:spLocks noGrp="1"/>
+          </p:cNvSpPr>
+          <p:nvPr>
+            <p:ph type="subTitle" idx="1"/>
+          </p:nvPr>
+        </p:nvSpPr>
+        <p:spPr/>
+        <p:txBody>
+          <a:bodyPr/>
+          <a:p>
+            <a:r>
+              <a:rPr lang="zh-CN" altLang="en-US">
+                <a:sym typeface="+mn-ea"/>
+              </a:rPr>
+              <a:t>A</a:t>
+            </a:r>
+            <a:r>
+              <a:rPr lang="en-US" altLang="zh-CN">
+                <a:sym typeface="+mn-ea"/>
+              </a:rPr>
+              <a:t> </a:t>
+            </a:r>
+            <a:r>
+              <a:rPr lang="zh-CN" altLang="en-US">
+                <a:sym typeface="+mn-ea"/>
+              </a:rPr>
+              <a:t>controller that can </a:t>
+            </a:r>
+            <a:r>
+              <a:rPr lang="en-US" altLang="zh-CN">
+                <a:sym typeface="+mn-ea"/>
+              </a:rPr>
+              <a:t>continuously </a:t>
+            </a:r>
+            <a:r>
+              <a:rPr lang="zh-CN" altLang="en-US">
+                <a:sym typeface="+mn-ea"/>
+              </a:rPr>
+              <a:t>feedback the motion state of dynamic objects</a:t>
+            </a:r>
+            <a:r>
+              <a:rPr lang="en-US" altLang="zh-CN">
+                <a:sym typeface="+mn-ea"/>
+              </a:rPr>
+              <a:t> under VR environment</a:t>
+            </a:r>
+            <a:endParaRPr lang="en-US" altLang="zh-CN">
+              <a:sym typeface="+mn-ea"/>
+            </a:endParaRPr>
           </a:p>
         </p:txBody>
       </p:sp>
@@ -3782,6 +3870,106 @@
 </file>
 
 <file path=ppt/slides/slide12.xml><?xml version="1.0" encoding="utf-8"?>
+<p:sld xmlns:a="http://schemas.openxmlformats.org/drawingml/2006/main" xmlns:r="http://schemas.openxmlformats.org/officeDocument/2006/relationships" xmlns:p="http://schemas.openxmlformats.org/presentationml/2006/main">
+  <p:cSld>
+    <p:spTree>
+      <p:nvGrpSpPr>
+        <p:cNvPr id="1" name=""/>
+        <p:cNvGrpSpPr/>
+        <p:nvPr/>
+      </p:nvGrpSpPr>
+      <p:grpSpPr/>
+      <p:sp>
+        <p:nvSpPr>
+          <p:cNvPr id="2" name="标题 1"/>
+          <p:cNvSpPr>
+            <a:spLocks noGrp="1"/>
+          </p:cNvSpPr>
+          <p:nvPr>
+            <p:ph type="title"/>
+          </p:nvPr>
+        </p:nvSpPr>
+        <p:spPr/>
+        <p:txBody>
+          <a:bodyPr/>
+          <a:p>
+            <a:endParaRPr lang="zh-CN" altLang="en-US"/>
+          </a:p>
+        </p:txBody>
+      </p:sp>
+      <p:sp>
+        <p:nvSpPr>
+          <p:cNvPr id="3" name="内容占位符 2"/>
+          <p:cNvSpPr>
+            <a:spLocks noGrp="1"/>
+          </p:cNvSpPr>
+          <p:nvPr>
+            <p:ph idx="1"/>
+          </p:nvPr>
+        </p:nvSpPr>
+        <p:spPr/>
+        <p:txBody>
+          <a:bodyPr/>
+          <a:p>
+            <a:pPr marL="0" indent="0">
+              <a:buNone/>
+            </a:pPr>
+            <a:r>
+              <a:rPr lang="en-US" altLang="en-US"/>
+              <a:t>&gt; </a:t>
+            </a:r>
+            <a:r>
+              <a:rPr lang="zh-CN" altLang="en-US"/>
+              <a:t>A Survey on Simulation for Weight Perception in Virtual Reality</a:t>
+            </a:r>
+            <a:endParaRPr lang="zh-CN" altLang="en-US"/>
+          </a:p>
+          <a:p>
+            <a:endParaRPr lang="zh-CN" altLang="en-US"/>
+          </a:p>
+          <a:p>
+            <a:r>
+              <a:rPr lang="en-US" altLang="zh-CN"/>
+              <a:t>I</a:t>
+            </a:r>
+            <a:r>
+              <a:rPr lang="zh-CN" altLang="en-US"/>
+              <a:t>nconsistency of vistual feedback and real hand motion</a:t>
+            </a:r>
+            <a:endParaRPr lang="zh-CN" altLang="en-US"/>
+          </a:p>
+        </p:txBody>
+      </p:sp>
+      <p:sp>
+        <p:nvSpPr>
+          <p:cNvPr id="4" name="灯片编号占位符 3"/>
+          <p:cNvSpPr>
+            <a:spLocks noGrp="1"/>
+          </p:cNvSpPr>
+          <p:nvPr>
+            <p:ph type="sldNum" sz="quarter" idx="12"/>
+          </p:nvPr>
+        </p:nvSpPr>
+        <p:spPr/>
+        <p:txBody>
+          <a:bodyPr/>
+          <a:p>
+            <a:fld id="{565CE74E-AB26-4998-AD42-012C4C1AD076}" type="slidenum">
+              <a:rPr lang="zh-CN" altLang="en-US" smtClean="0"/>
+            </a:fld>
+            <a:endParaRPr lang="zh-CN" altLang="en-US"/>
+          </a:p>
+        </p:txBody>
+      </p:sp>
+    </p:spTree>
+  </p:cSld>
+  <p:clrMapOvr>
+    <a:masterClrMapping/>
+  </p:clrMapOvr>
+</p:sld>
+</file>
+
+<file path=ppt/slides/slide13.xml><?xml version="1.0" encoding="utf-8"?>
 <p:sld xmlns:a="http://schemas.openxmlformats.org/drawingml/2006/main" xmlns:r="http://schemas.openxmlformats.org/officeDocument/2006/relationships" xmlns:p="http://schemas.openxmlformats.org/presentationml/2006/main" show="0">
   <p:cSld>
     <p:spTree>

</xml_diff>